<commit_message>
adding changes to slides 8
</commit_message>
<xml_diff>
--- a/Docs/Presentations/Slides/#8 challenges and solutions.pptx
+++ b/Docs/Presentations/Slides/#8 challenges and solutions.pptx
@@ -4199,19 +4199,7 @@
               <a:rPr lang="en-US" sz="8000" dirty="0" smtClean="0">
                 <a:latin typeface="Garamond" panose="02020404030301010803" pitchFamily="18" charset="0"/>
               </a:rPr>
-              <a:t>Challenges </a:t>
-            </a:r>
-            <a:r>
-              <a:rPr lang="en-US" sz="8000" dirty="0" smtClean="0">
-                <a:latin typeface="Garamond" panose="02020404030301010803" pitchFamily="18" charset="0"/>
-              </a:rPr>
-              <a:t>/ </a:t>
-            </a:r>
-            <a:r>
-              <a:rPr lang="en-US" sz="8000" dirty="0" smtClean="0">
-                <a:latin typeface="Garamond" panose="02020404030301010803" pitchFamily="18" charset="0"/>
-              </a:rPr>
-              <a:t>Solutions:</a:t>
+              <a:t>Challenges / Solutions:</a:t>
             </a:r>
             <a:br>
               <a:rPr lang="en-US" sz="8000" dirty="0" smtClean="0">
@@ -4222,13 +4210,7 @@
               <a:rPr lang="en-US" sz="8000" dirty="0" smtClean="0">
                 <a:latin typeface="Garamond" panose="02020404030301010803" pitchFamily="18" charset="0"/>
               </a:rPr>
-              <a:t>Fabrication</a:t>
-            </a:r>
-            <a:r>
-              <a:rPr lang="en-US" sz="8000" dirty="0" smtClean="0">
-                <a:latin typeface="Garamond" panose="02020404030301010803" pitchFamily="18" charset="0"/>
-              </a:rPr>
-              <a:t> </a:t>
+              <a:t>Fabrication </a:t>
             </a:r>
             <a:endParaRPr lang="en-US" sz="8000" dirty="0">
               <a:latin typeface="Garamond" panose="02020404030301010803" pitchFamily="18" charset="0"/>
@@ -4273,6 +4255,13 @@
   <p:clrMapOvr>
     <a:masterClrMapping/>
   </p:clrMapOvr>
+  <p:timing>
+    <p:tnLst>
+      <p:par>
+        <p:cTn id="1" dur="indefinite" restart="never" nodeType="tmRoot"/>
+      </p:par>
+    </p:tnLst>
+  </p:timing>
 </p:sld>
 </file>
 
@@ -4661,59 +4650,6 @@
           </a:fontRef>
         </p:style>
       </p:cxnSp>
-      <p:sp>
-        <p:nvSpPr>
-          <p:cNvPr id="11" name="Title 1"/>
-          <p:cNvSpPr txBox="1">
-            <a:spLocks/>
-          </p:cNvSpPr>
-          <p:nvPr/>
-        </p:nvSpPr>
-        <p:spPr>
-          <a:xfrm>
-            <a:off x="417265" y="797859"/>
-            <a:ext cx="10515600" cy="602673"/>
-          </a:xfrm>
-          <a:prstGeom prst="rect">
-            <a:avLst/>
-          </a:prstGeom>
-        </p:spPr>
-        <p:txBody>
-          <a:bodyPr vert="horz" lIns="91440" tIns="45720" rIns="91440" bIns="45720" rtlCol="0" anchor="b">
-            <a:noAutofit/>
-          </a:bodyPr>
-          <a:lstStyle>
-            <a:lvl1pPr algn="ctr" defTabSz="914400" rtl="0" eaLnBrk="1" latinLnBrk="0" hangingPunct="1">
-              <a:lnSpc>
-                <a:spcPct val="90000"/>
-              </a:lnSpc>
-              <a:spcBef>
-                <a:spcPct val="0"/>
-              </a:spcBef>
-              <a:buNone/>
-              <a:defRPr sz="6000" kern="1200">
-                <a:solidFill>
-                  <a:schemeClr val="tx1"/>
-                </a:solidFill>
-                <a:latin typeface="+mj-lt"/>
-                <a:ea typeface="+mj-ea"/>
-                <a:cs typeface="+mj-cs"/>
-              </a:defRPr>
-            </a:lvl1pPr>
-          </a:lstStyle>
-          <a:p>
-            <a:r>
-              <a:rPr lang="en-US" sz="3200" dirty="0" smtClean="0">
-                <a:latin typeface="Garamond" panose="02020404030301010803" pitchFamily="18" charset="0"/>
-              </a:rPr>
-              <a:t>Fabrication takes a lot of time.</a:t>
-            </a:r>
-            <a:endParaRPr lang="en-US" sz="3200" dirty="0">
-              <a:latin typeface="Garamond" panose="02020404030301010803" pitchFamily="18" charset="0"/>
-            </a:endParaRPr>
-          </a:p>
-        </p:txBody>
-      </p:sp>
     </p:spTree>
     <p:extLst>
       <p:ext uri="{BB962C8B-B14F-4D97-AF65-F5344CB8AC3E}">

</xml_diff>

<commit_message>
updating slide section 8
</commit_message>
<xml_diff>
--- a/Docs/Presentations/Slides/#8 challenges and solutions.pptx
+++ b/Docs/Presentations/Slides/#8 challenges and solutions.pptx
@@ -5,18 +5,17 @@
     <p:sldMasterId id="2147483660" r:id="rId1"/>
   </p:sldMasterIdLst>
   <p:notesMasterIdLst>
-    <p:notesMasterId r:id="rId8"/>
+    <p:notesMasterId r:id="rId7"/>
   </p:notesMasterIdLst>
   <p:handoutMasterIdLst>
-    <p:handoutMasterId r:id="rId9"/>
+    <p:handoutMasterId r:id="rId8"/>
   </p:handoutMasterIdLst>
   <p:sldIdLst>
-    <p:sldId id="257" r:id="rId2"/>
-    <p:sldId id="258" r:id="rId3"/>
-    <p:sldId id="256" r:id="rId4"/>
-    <p:sldId id="261" r:id="rId5"/>
-    <p:sldId id="259" r:id="rId6"/>
-    <p:sldId id="260" r:id="rId7"/>
+    <p:sldId id="258" r:id="rId2"/>
+    <p:sldId id="261" r:id="rId3"/>
+    <p:sldId id="262" r:id="rId4"/>
+    <p:sldId id="259" r:id="rId5"/>
+    <p:sldId id="260" r:id="rId6"/>
   </p:sldIdLst>
   <p:sldSz cx="12192000" cy="6858000"/>
   <p:notesSz cx="6858000" cy="9144000"/>
@@ -703,7 +702,7 @@
           <a:p>
             <a:fld id="{41270EAE-2722-4055-9DC6-0148D79BD176}" type="slidenum">
               <a:rPr lang="en-US" smtClean="0"/>
-              <a:t>3</a:t>
+              <a:t>2</a:t>
             </a:fld>
             <a:endParaRPr lang="en-US"/>
           </a:p>
@@ -712,7 +711,7 @@
     </p:spTree>
     <p:extLst>
       <p:ext uri="{BB962C8B-B14F-4D97-AF65-F5344CB8AC3E}">
-        <p14:creationId xmlns:p14="http://schemas.microsoft.com/office/powerpoint/2010/main" val="474839590"/>
+        <p14:creationId xmlns:p14="http://schemas.microsoft.com/office/powerpoint/2010/main" val="2717894459"/>
       </p:ext>
     </p:extLst>
   </p:cSld>
@@ -787,7 +786,7 @@
           <a:p>
             <a:fld id="{41270EAE-2722-4055-9DC6-0148D79BD176}" type="slidenum">
               <a:rPr lang="en-US" smtClean="0"/>
-              <a:t>4</a:t>
+              <a:t>3</a:t>
             </a:fld>
             <a:endParaRPr lang="en-US"/>
           </a:p>
@@ -796,7 +795,7 @@
     </p:spTree>
     <p:extLst>
       <p:ext uri="{BB962C8B-B14F-4D97-AF65-F5344CB8AC3E}">
-        <p14:creationId xmlns:p14="http://schemas.microsoft.com/office/powerpoint/2010/main" val="2717894459"/>
+        <p14:creationId xmlns:p14="http://schemas.microsoft.com/office/powerpoint/2010/main" val="995209575"/>
       </p:ext>
     </p:extLst>
   </p:cSld>
@@ -871,7 +870,7 @@
           <a:p>
             <a:fld id="{41270EAE-2722-4055-9DC6-0148D79BD176}" type="slidenum">
               <a:rPr lang="en-US" smtClean="0"/>
-              <a:t>5</a:t>
+              <a:t>4</a:t>
             </a:fld>
             <a:endParaRPr lang="en-US"/>
           </a:p>
@@ -955,7 +954,7 @@
           <a:p>
             <a:fld id="{41270EAE-2722-4055-9DC6-0148D79BD176}" type="slidenum">
               <a:rPr lang="en-US" smtClean="0"/>
-              <a:t>6</a:t>
+              <a:t>5</a:t>
             </a:fld>
             <a:endParaRPr lang="en-US"/>
           </a:p>
@@ -3839,95 +3838,40 @@
             <a:spLocks noGrp="1"/>
           </p:cNvSpPr>
           <p:nvPr>
-            <p:ph type="ctrTitle"/>
+            <p:ph type="title"/>
           </p:nvPr>
         </p:nvSpPr>
         <p:spPr>
           <a:xfrm>
-            <a:off x="1524000" y="0"/>
-            <a:ext cx="9144000" cy="1798638"/>
+            <a:off x="838200" y="2655607"/>
+            <a:ext cx="10515600" cy="1325563"/>
           </a:xfrm>
         </p:spPr>
         <p:txBody>
           <a:bodyPr>
-            <a:normAutofit fontScale="90000"/>
+            <a:noAutofit/>
           </a:bodyPr>
           <a:lstStyle/>
           <a:p>
             <a:r>
-              <a:rPr lang="en-US" sz="6600" b="1" dirty="0" smtClean="0">
+              <a:rPr lang="en-US" sz="8000" dirty="0" smtClean="0">
                 <a:latin typeface="Garamond" panose="02020404030301010803" pitchFamily="18" charset="0"/>
-                <a:cs typeface="Times New Roman" panose="02020603050405020304" pitchFamily="18" charset="0"/>
               </a:rPr>
-              <a:t>Electronic Propellant Feed System </a:t>
-            </a:r>
-            <a:endParaRPr lang="en-US" sz="6600" b="1" dirty="0">
+              <a:t>Challenges / Solutions:</a:t>
+            </a:r>
+            <a:br>
+              <a:rPr lang="en-US" sz="8000" dirty="0" smtClean="0">
+                <a:latin typeface="Garamond" panose="02020404030301010803" pitchFamily="18" charset="0"/>
+              </a:rPr>
+            </a:br>
+            <a:r>
+              <a:rPr lang="en-US" sz="8000" dirty="0" smtClean="0">
+                <a:latin typeface="Garamond" panose="02020404030301010803" pitchFamily="18" charset="0"/>
+              </a:rPr>
+              <a:t>Fabrication </a:t>
+            </a:r>
+            <a:endParaRPr lang="en-US" sz="8000" dirty="0">
               <a:latin typeface="Garamond" panose="02020404030301010803" pitchFamily="18" charset="0"/>
-              <a:cs typeface="Times New Roman" panose="02020603050405020304" pitchFamily="18" charset="0"/>
-            </a:endParaRPr>
-          </a:p>
-        </p:txBody>
-      </p:sp>
-      <p:sp>
-        <p:nvSpPr>
-          <p:cNvPr id="3" name="Subtitle 2"/>
-          <p:cNvSpPr>
-            <a:spLocks noGrp="1"/>
-          </p:cNvSpPr>
-          <p:nvPr>
-            <p:ph type="subTitle" idx="1"/>
-          </p:nvPr>
-        </p:nvSpPr>
-        <p:spPr>
-          <a:xfrm>
-            <a:off x="146104" y="6062265"/>
-            <a:ext cx="11899788" cy="953294"/>
-          </a:xfrm>
-        </p:spPr>
-        <p:txBody>
-          <a:bodyPr>
-            <a:normAutofit/>
-          </a:bodyPr>
-          <a:lstStyle/>
-          <a:p>
-            <a:r>
-              <a:rPr lang="en-US" altLang="en-US" sz="1600" i="1" dirty="0">
-                <a:latin typeface="Garamond" panose="02020404030301010803" pitchFamily="18" charset="0"/>
-                <a:cs typeface="Times New Roman" panose="02020603050405020304" pitchFamily="18" charset="0"/>
-              </a:rPr>
-              <a:t>Affiliations: </a:t>
-            </a:r>
-            <a:r>
-              <a:rPr lang="en-US" altLang="en-US" sz="1600" i="1" baseline="30000" dirty="0" smtClean="0">
-                <a:latin typeface="Garamond" panose="02020404030301010803" pitchFamily="18" charset="0"/>
-                <a:cs typeface="Times New Roman" panose="02020603050405020304" pitchFamily="18" charset="0"/>
-              </a:rPr>
-              <a:t>1</a:t>
-            </a:r>
-            <a:r>
-              <a:rPr lang="en-US" altLang="en-US" sz="1600" i="1" dirty="0" smtClean="0">
-                <a:latin typeface="Garamond" panose="02020404030301010803" pitchFamily="18" charset="0"/>
-                <a:cs typeface="Times New Roman" panose="02020603050405020304" pitchFamily="18" charset="0"/>
-              </a:rPr>
-              <a:t>Portland State Aerospace Society, </a:t>
-            </a:r>
-            <a:r>
-              <a:rPr lang="en-US" altLang="en-US" sz="1600" i="1" baseline="30000" dirty="0">
-                <a:latin typeface="Garamond" panose="02020404030301010803" pitchFamily="18" charset="0"/>
-                <a:cs typeface="Times New Roman" panose="02020603050405020304" pitchFamily="18" charset="0"/>
-              </a:rPr>
-              <a:t>2</a:t>
-            </a:r>
-            <a:r>
-              <a:rPr lang="en-US" altLang="en-US" sz="1600" i="1" dirty="0">
-                <a:latin typeface="Garamond" panose="02020404030301010803" pitchFamily="18" charset="0"/>
-                <a:cs typeface="Times New Roman" panose="02020603050405020304" pitchFamily="18" charset="0"/>
-              </a:rPr>
-              <a:t>Maseeh College of Engineering and Computer Science Portland, OR, 97201, United States</a:t>
-            </a:r>
-            <a:endParaRPr lang="en-US" sz="1600" i="1" dirty="0">
-              <a:latin typeface="Garamond" panose="02020404030301010803" pitchFamily="18" charset="0"/>
-              <a:cs typeface="Times New Roman" panose="02020603050405020304" pitchFamily="18" charset="0"/>
             </a:endParaRPr>
           </a:p>
         </p:txBody>
@@ -3950,188 +3894,11 @@
             <a:fld id="{27225834-A5F4-4780-A9FC-586FB30F9BB0}" type="slidenum">
               <a:rPr lang="en-US" smtClean="0">
                 <a:latin typeface="Garamond" panose="02020404030301010803" pitchFamily="18" charset="0"/>
-                <a:cs typeface="Times New Roman" panose="02020603050405020304" pitchFamily="18" charset="0"/>
               </a:rPr>
               <a:t>1</a:t>
             </a:fld>
             <a:endParaRPr lang="en-US">
               <a:latin typeface="Garamond" panose="02020404030301010803" pitchFamily="18" charset="0"/>
-              <a:cs typeface="Times New Roman" panose="02020603050405020304" pitchFamily="18" charset="0"/>
-            </a:endParaRPr>
-          </a:p>
-        </p:txBody>
-      </p:sp>
-      <p:sp>
-        <p:nvSpPr>
-          <p:cNvPr id="5" name="TextBox 4"/>
-          <p:cNvSpPr txBox="1"/>
-          <p:nvPr/>
-        </p:nvSpPr>
-        <p:spPr>
-          <a:xfrm>
-            <a:off x="1300047" y="1836254"/>
-            <a:ext cx="9591901" cy="400110"/>
-          </a:xfrm>
-          <a:prstGeom prst="rect">
-            <a:avLst/>
-          </a:prstGeom>
-          <a:noFill/>
-        </p:spPr>
-        <p:txBody>
-          <a:bodyPr wrap="square" rtlCol="0">
-            <a:spAutoFit/>
-          </a:bodyPr>
-          <a:lstStyle/>
-          <a:p>
-            <a:pPr algn="ctr"/>
-            <a:r>
-              <a:rPr lang="en-US" sz="2000" dirty="0" smtClean="0">
-                <a:latin typeface="Garamond" panose="02020404030301010803" pitchFamily="18" charset="0"/>
-                <a:cs typeface="Times New Roman" panose="02020603050405020304" pitchFamily="18" charset="0"/>
-              </a:rPr>
-              <a:t>Johnny Froehlich, Jonathan Talik, James Luce, Rawand Rasheed, Mimi Shang, Jordan Roland</a:t>
-            </a:r>
-            <a:endParaRPr lang="en-US" sz="2000" dirty="0">
-              <a:latin typeface="Garamond" panose="02020404030301010803" pitchFamily="18" charset="0"/>
-              <a:cs typeface="Times New Roman" panose="02020603050405020304" pitchFamily="18" charset="0"/>
-            </a:endParaRPr>
-          </a:p>
-        </p:txBody>
-      </p:sp>
-      <p:pic>
-        <p:nvPicPr>
-          <p:cNvPr id="8" name="Picture 7"/>
-          <p:cNvPicPr>
-            <a:picLocks noChangeAspect="1"/>
-          </p:cNvPicPr>
-          <p:nvPr/>
-        </p:nvPicPr>
-        <p:blipFill>
-          <a:blip r:embed="rId2"/>
-          <a:stretch>
-            <a:fillRect/>
-          </a:stretch>
-        </p:blipFill>
-        <p:spPr>
-          <a:xfrm>
-            <a:off x="609600" y="2581756"/>
-            <a:ext cx="3484384" cy="3163353"/>
-          </a:xfrm>
-          <a:prstGeom prst="rect">
-            <a:avLst/>
-          </a:prstGeom>
-        </p:spPr>
-      </p:pic>
-      <p:pic>
-        <p:nvPicPr>
-          <p:cNvPr id="9" name="Picture 8"/>
-          <p:cNvPicPr>
-            <a:picLocks noChangeAspect="1"/>
-          </p:cNvPicPr>
-          <p:nvPr/>
-        </p:nvPicPr>
-        <p:blipFill>
-          <a:blip r:embed="rId3"/>
-          <a:stretch>
-            <a:fillRect/>
-          </a:stretch>
-        </p:blipFill>
-        <p:spPr>
-          <a:xfrm>
-            <a:off x="4459284" y="2562948"/>
-            <a:ext cx="3273425" cy="3163353"/>
-          </a:xfrm>
-          <a:prstGeom prst="rect">
-            <a:avLst/>
-          </a:prstGeom>
-        </p:spPr>
-      </p:pic>
-      <p:pic>
-        <p:nvPicPr>
-          <p:cNvPr id="1028" name="Picture 4" descr="http://www.freelogovectors.net/wp-content/uploads/2014/06/PSU-seal-Portland-State-University.jpg"/>
-          <p:cNvPicPr>
-            <a:picLocks noChangeAspect="1" noChangeArrowheads="1"/>
-          </p:cNvPicPr>
-          <p:nvPr/>
-        </p:nvPicPr>
-        <p:blipFill>
-          <a:blip r:embed="rId4">
-            <a:extLst>
-              <a:ext uri="{28A0092B-C50C-407E-A947-70E740481C1C}">
-                <a14:useLocalDpi xmlns:a14="http://schemas.microsoft.com/office/drawing/2010/main" val="0"/>
-              </a:ext>
-            </a:extLst>
-          </a:blip>
-          <a:srcRect/>
-          <a:stretch>
-            <a:fillRect/>
-          </a:stretch>
-        </p:blipFill>
-        <p:spPr bwMode="auto">
-          <a:xfrm>
-            <a:off x="8098013" y="2510733"/>
-            <a:ext cx="3209494" cy="3234376"/>
-          </a:xfrm>
-          <a:prstGeom prst="rect">
-            <a:avLst/>
-          </a:prstGeom>
-          <a:noFill/>
-          <a:extLst>
-            <a:ext uri="{909E8E84-426E-40DD-AFC4-6F175D3DCCD1}">
-              <a14:hiddenFill xmlns:a14="http://schemas.microsoft.com/office/drawing/2010/main">
-                <a:solidFill>
-                  <a:srgbClr val="FFFFFF"/>
-                </a:solidFill>
-              </a14:hiddenFill>
-            </a:ext>
-          </a:extLst>
-        </p:spPr>
-      </p:pic>
-      <p:sp>
-        <p:nvSpPr>
-          <p:cNvPr id="10" name="Rectangle 9"/>
-          <p:cNvSpPr/>
-          <p:nvPr/>
-        </p:nvSpPr>
-        <p:spPr>
-          <a:xfrm>
-            <a:off x="10668000" y="5397500"/>
-            <a:ext cx="317500" cy="203200"/>
-          </a:xfrm>
-          <a:prstGeom prst="rect">
-            <a:avLst/>
-          </a:prstGeom>
-          <a:solidFill>
-            <a:schemeClr val="bg1"/>
-          </a:solidFill>
-          <a:ln>
-            <a:noFill/>
-          </a:ln>
-        </p:spPr>
-        <p:style>
-          <a:lnRef idx="2">
-            <a:schemeClr val="accent1">
-              <a:shade val="50000"/>
-            </a:schemeClr>
-          </a:lnRef>
-          <a:fillRef idx="1">
-            <a:schemeClr val="accent1"/>
-          </a:fillRef>
-          <a:effectRef idx="0">
-            <a:schemeClr val="accent1"/>
-          </a:effectRef>
-          <a:fontRef idx="minor">
-            <a:schemeClr val="lt1"/>
-          </a:fontRef>
-        </p:style>
-        <p:txBody>
-          <a:bodyPr rtlCol="0" anchor="ctr"/>
-          <a:lstStyle/>
-          <a:p>
-            <a:pPr algn="ctr"/>
-            <a:endParaRPr lang="en-US">
-              <a:latin typeface="Garamond" panose="02020404030301010803" pitchFamily="18" charset="0"/>
-              <a:cs typeface="Times New Roman" panose="02020603050405020304" pitchFamily="18" charset="0"/>
             </a:endParaRPr>
           </a:p>
         </p:txBody>
@@ -4139,7 +3906,7 @@
     </p:spTree>
     <p:extLst>
       <p:ext uri="{BB962C8B-B14F-4D97-AF65-F5344CB8AC3E}">
-        <p14:creationId xmlns:p14="http://schemas.microsoft.com/office/powerpoint/2010/main" val="1836374640"/>
+        <p14:creationId xmlns:p14="http://schemas.microsoft.com/office/powerpoint/2010/main" val="3747152541"/>
       </p:ext>
     </p:extLst>
   </p:cSld>
@@ -4175,44 +3942,157 @@
       </p:grpSpPr>
       <p:sp>
         <p:nvSpPr>
-          <p:cNvPr id="2" name="Title 1"/>
-          <p:cNvSpPr>
-            <a:spLocks noGrp="1"/>
-          </p:cNvSpPr>
-          <p:nvPr>
-            <p:ph type="title"/>
-          </p:nvPr>
+          <p:cNvPr id="8" name="Title 1"/>
+          <p:cNvSpPr txBox="1">
+            <a:spLocks/>
+          </p:cNvSpPr>
+          <p:nvPr/>
         </p:nvSpPr>
         <p:spPr>
           <a:xfrm>
-            <a:off x="838200" y="2655607"/>
-            <a:ext cx="10515600" cy="1325563"/>
+            <a:off x="775854" y="0"/>
+            <a:ext cx="10515600" cy="602673"/>
           </a:xfrm>
+          <a:prstGeom prst="rect">
+            <a:avLst/>
+          </a:prstGeom>
         </p:spPr>
         <p:txBody>
-          <a:bodyPr>
+          <a:bodyPr vert="horz" lIns="91440" tIns="45720" rIns="91440" bIns="45720" rtlCol="0" anchor="b">
             <a:noAutofit/>
           </a:bodyPr>
-          <a:lstStyle/>
-          <a:p>
-            <a:r>
-              <a:rPr lang="en-US" sz="8000" dirty="0" smtClean="0">
+          <a:lstStyle>
+            <a:lvl1pPr algn="ctr" defTabSz="914400" rtl="0" eaLnBrk="1" latinLnBrk="0" hangingPunct="1">
+              <a:lnSpc>
+                <a:spcPct val="90000"/>
+              </a:lnSpc>
+              <a:spcBef>
+                <a:spcPct val="0"/>
+              </a:spcBef>
+              <a:buNone/>
+              <a:defRPr sz="6000" kern="1200">
+                <a:solidFill>
+                  <a:schemeClr val="tx1"/>
+                </a:solidFill>
+                <a:latin typeface="+mj-lt"/>
+                <a:ea typeface="+mj-ea"/>
+                <a:cs typeface="+mj-cs"/>
+              </a:defRPr>
+            </a:lvl1pPr>
+          </a:lstStyle>
+          <a:p>
+            <a:r>
+              <a:rPr lang="en-US" sz="3200" dirty="0" smtClean="0">
                 <a:latin typeface="Garamond" panose="02020404030301010803" pitchFamily="18" charset="0"/>
               </a:rPr>
-              <a:t>Challenges / Solutions:</a:t>
-            </a:r>
-            <a:br>
-              <a:rPr lang="en-US" sz="8000" dirty="0" smtClean="0">
+              <a:t>Challenges &amp; Solutions: Fabrication </a:t>
+            </a:r>
+            <a:endParaRPr lang="en-US" sz="3200" dirty="0">
+              <a:latin typeface="Garamond" panose="02020404030301010803" pitchFamily="18" charset="0"/>
+            </a:endParaRPr>
+          </a:p>
+        </p:txBody>
+      </p:sp>
+      <p:cxnSp>
+        <p:nvCxnSpPr>
+          <p:cNvPr id="3" name="Straight Connector 2"/>
+          <p:cNvCxnSpPr/>
+          <p:nvPr/>
+        </p:nvCxnSpPr>
+        <p:spPr>
+          <a:xfrm>
+            <a:off x="519545" y="644238"/>
+            <a:ext cx="11055928" cy="0"/>
+          </a:xfrm>
+          <a:prstGeom prst="line">
+            <a:avLst/>
+          </a:prstGeom>
+        </p:spPr>
+        <p:style>
+          <a:lnRef idx="1">
+            <a:schemeClr val="dk1"/>
+          </a:lnRef>
+          <a:fillRef idx="0">
+            <a:schemeClr val="dk1"/>
+          </a:fillRef>
+          <a:effectRef idx="0">
+            <a:schemeClr val="dk1"/>
+          </a:effectRef>
+          <a:fontRef idx="minor">
+            <a:schemeClr val="tx1"/>
+          </a:fontRef>
+        </p:style>
+      </p:cxnSp>
+      <p:sp>
+        <p:nvSpPr>
+          <p:cNvPr id="4" name="Title 1"/>
+          <p:cNvSpPr txBox="1">
+            <a:spLocks/>
+          </p:cNvSpPr>
+          <p:nvPr/>
+        </p:nvSpPr>
+        <p:spPr>
+          <a:xfrm>
+            <a:off x="789709" y="885371"/>
+            <a:ext cx="10515600" cy="5067560"/>
+          </a:xfrm>
+          <a:prstGeom prst="rect">
+            <a:avLst/>
+          </a:prstGeom>
+        </p:spPr>
+        <p:txBody>
+          <a:bodyPr vert="horz" lIns="91440" tIns="45720" rIns="91440" bIns="45720" rtlCol="0" anchor="t">
+            <a:noAutofit/>
+          </a:bodyPr>
+          <a:lstStyle>
+            <a:lvl1pPr algn="ctr" defTabSz="914400" rtl="0" eaLnBrk="1" latinLnBrk="0" hangingPunct="1">
+              <a:lnSpc>
+                <a:spcPct val="90000"/>
+              </a:lnSpc>
+              <a:spcBef>
+                <a:spcPct val="0"/>
+              </a:spcBef>
+              <a:buNone/>
+              <a:defRPr sz="6000" kern="1200">
+                <a:solidFill>
+                  <a:schemeClr val="tx1"/>
+                </a:solidFill>
+                <a:latin typeface="+mj-lt"/>
+                <a:ea typeface="+mj-ea"/>
+                <a:cs typeface="+mj-cs"/>
+              </a:defRPr>
+            </a:lvl1pPr>
+          </a:lstStyle>
+          <a:p>
+            <a:pPr marL="457200" indent="-457200" algn="l">
+              <a:buFont typeface="Arial" panose="020B0604020202020204" pitchFamily="34" charset="0"/>
+              <a:buChar char="•"/>
+            </a:pPr>
+            <a:r>
+              <a:rPr lang="en-US" sz="3200" dirty="0" smtClean="0">
                 <a:latin typeface="Garamond" panose="02020404030301010803" pitchFamily="18" charset="0"/>
               </a:rPr>
-            </a:br>
-            <a:r>
-              <a:rPr lang="en-US" sz="8000" dirty="0" smtClean="0">
+              <a:t>Head v. flow requirements meant commercially available pumps wouldn’t work.</a:t>
+            </a:r>
+          </a:p>
+          <a:p>
+            <a:pPr marL="457200" indent="-457200" algn="l">
+              <a:buFont typeface="Arial" panose="020B0604020202020204" pitchFamily="34" charset="0"/>
+              <a:buChar char="•"/>
+            </a:pPr>
+            <a:r>
+              <a:rPr lang="en-US" sz="3200" dirty="0" smtClean="0">
                 <a:latin typeface="Garamond" panose="02020404030301010803" pitchFamily="18" charset="0"/>
               </a:rPr>
-              <a:t>Fabrication </a:t>
-            </a:r>
-            <a:endParaRPr lang="en-US" sz="8000" dirty="0">
+              <a:t>Outsourcing fabrication would be cost prohibitive.</a:t>
+            </a:r>
+          </a:p>
+          <a:p>
+            <a:pPr marL="457200" indent="-457200" algn="l">
+              <a:buFont typeface="Arial" panose="020B0604020202020204" pitchFamily="34" charset="0"/>
+              <a:buChar char="•"/>
+            </a:pPr>
+            <a:endParaRPr lang="en-US" sz="3200" dirty="0">
               <a:latin typeface="Garamond" panose="02020404030301010803" pitchFamily="18" charset="0"/>
             </a:endParaRPr>
           </a:p>
@@ -4220,35 +4100,205 @@
       </p:sp>
       <p:sp>
         <p:nvSpPr>
-          <p:cNvPr id="4" name="Slide Number Placeholder 3"/>
-          <p:cNvSpPr>
-            <a:spLocks noGrp="1"/>
-          </p:cNvSpPr>
-          <p:nvPr>
-            <p:ph type="sldNum" sz="quarter" idx="12"/>
-          </p:nvPr>
-        </p:nvSpPr>
-        <p:spPr/>
-        <p:txBody>
-          <a:bodyPr/>
-          <a:lstStyle/>
-          <a:p>
-            <a:fld id="{27225834-A5F4-4780-A9FC-586FB30F9BB0}" type="slidenum">
-              <a:rPr lang="en-US" smtClean="0">
-                <a:latin typeface="Garamond" panose="02020404030301010803" pitchFamily="18" charset="0"/>
-              </a:rPr>
-              <a:t>2</a:t>
-            </a:fld>
-            <a:endParaRPr lang="en-US">
-              <a:latin typeface="Garamond" panose="02020404030301010803" pitchFamily="18" charset="0"/>
-            </a:endParaRPr>
-          </a:p>
-        </p:txBody>
-      </p:sp>
+          <p:cNvPr id="6" name="Right Arrow 5"/>
+          <p:cNvSpPr/>
+          <p:nvPr/>
+        </p:nvSpPr>
+        <p:spPr>
+          <a:xfrm>
+            <a:off x="4518885" y="4172844"/>
+            <a:ext cx="346762" cy="225001"/>
+          </a:xfrm>
+          <a:prstGeom prst="rightArrow">
+            <a:avLst/>
+          </a:prstGeom>
+        </p:spPr>
+        <p:style>
+          <a:lnRef idx="2">
+            <a:schemeClr val="accent1">
+              <a:shade val="50000"/>
+            </a:schemeClr>
+          </a:lnRef>
+          <a:fillRef idx="1">
+            <a:schemeClr val="accent1"/>
+          </a:fillRef>
+          <a:effectRef idx="0">
+            <a:schemeClr val="accent1"/>
+          </a:effectRef>
+          <a:fontRef idx="minor">
+            <a:schemeClr val="lt1"/>
+          </a:fontRef>
+        </p:style>
+        <p:txBody>
+          <a:bodyPr rtlCol="0" anchor="ctr"/>
+          <a:lstStyle/>
+          <a:p>
+            <a:pPr algn="ctr"/>
+            <a:endParaRPr lang="en-US"/>
+          </a:p>
+        </p:txBody>
+      </p:sp>
+      <p:pic>
+        <p:nvPicPr>
+          <p:cNvPr id="7" name="Picture 6"/>
+          <p:cNvPicPr>
+            <a:picLocks noChangeAspect="1"/>
+          </p:cNvPicPr>
+          <p:nvPr/>
+        </p:nvPicPr>
+        <p:blipFill>
+          <a:blip r:embed="rId3" cstate="print">
+            <a:extLst>
+              <a:ext uri="{BEBA8EAE-BF5A-486C-A8C5-ECC9F3942E4B}">
+                <a14:imgProps xmlns:a14="http://schemas.microsoft.com/office/drawing/2010/main">
+                  <a14:imgLayer r:embed="rId4">
+                    <a14:imgEffect>
+                      <a14:brightnessContrast bright="18000"/>
+                    </a14:imgEffect>
+                  </a14:imgLayer>
+                </a14:imgProps>
+              </a:ext>
+              <a:ext uri="{28A0092B-C50C-407E-A947-70E740481C1C}">
+                <a14:useLocalDpi xmlns:a14="http://schemas.microsoft.com/office/drawing/2010/main" val="0"/>
+              </a:ext>
+            </a:extLst>
+          </a:blip>
+          <a:stretch>
+            <a:fillRect/>
+          </a:stretch>
+        </p:blipFill>
+        <p:spPr>
+          <a:xfrm>
+            <a:off x="7722989" y="2795615"/>
+            <a:ext cx="3898490" cy="2923867"/>
+          </a:xfrm>
+          <a:prstGeom prst="rect">
+            <a:avLst/>
+          </a:prstGeom>
+        </p:spPr>
+      </p:pic>
+      <p:pic>
+        <p:nvPicPr>
+          <p:cNvPr id="2" name="Picture 1"/>
+          <p:cNvPicPr>
+            <a:picLocks noChangeAspect="1"/>
+          </p:cNvPicPr>
+          <p:nvPr/>
+        </p:nvPicPr>
+        <p:blipFill>
+          <a:blip r:embed="rId5" cstate="print">
+            <a:extLst>
+              <a:ext uri="{BEBA8EAE-BF5A-486C-A8C5-ECC9F3942E4B}">
+                <a14:imgProps xmlns:a14="http://schemas.microsoft.com/office/drawing/2010/main">
+                  <a14:imgLayer r:embed="rId6">
+                    <a14:imgEffect>
+                      <a14:brightnessContrast bright="13000" contrast="8000"/>
+                    </a14:imgEffect>
+                  </a14:imgLayer>
+                </a14:imgProps>
+              </a:ext>
+              <a:ext uri="{28A0092B-C50C-407E-A947-70E740481C1C}">
+                <a14:useLocalDpi xmlns:a14="http://schemas.microsoft.com/office/drawing/2010/main" val="0"/>
+              </a:ext>
+            </a:extLst>
+          </a:blip>
+          <a:stretch>
+            <a:fillRect/>
+          </a:stretch>
+        </p:blipFill>
+        <p:spPr>
+          <a:xfrm>
+            <a:off x="4970185" y="2795615"/>
+            <a:ext cx="2192899" cy="2923867"/>
+          </a:xfrm>
+          <a:prstGeom prst="rect">
+            <a:avLst/>
+          </a:prstGeom>
+        </p:spPr>
+      </p:pic>
+      <p:sp>
+        <p:nvSpPr>
+          <p:cNvPr id="9" name="Right Arrow 8"/>
+          <p:cNvSpPr/>
+          <p:nvPr/>
+        </p:nvSpPr>
+        <p:spPr>
+          <a:xfrm>
+            <a:off x="7267622" y="4172844"/>
+            <a:ext cx="346762" cy="225001"/>
+          </a:xfrm>
+          <a:prstGeom prst="rightArrow">
+            <a:avLst/>
+          </a:prstGeom>
+        </p:spPr>
+        <p:style>
+          <a:lnRef idx="2">
+            <a:schemeClr val="accent1">
+              <a:shade val="50000"/>
+            </a:schemeClr>
+          </a:lnRef>
+          <a:fillRef idx="1">
+            <a:schemeClr val="accent1"/>
+          </a:fillRef>
+          <a:effectRef idx="0">
+            <a:schemeClr val="accent1"/>
+          </a:effectRef>
+          <a:fontRef idx="minor">
+            <a:schemeClr val="lt1"/>
+          </a:fontRef>
+        </p:style>
+        <p:txBody>
+          <a:bodyPr rtlCol="0" anchor="ctr"/>
+          <a:lstStyle/>
+          <a:p>
+            <a:pPr algn="ctr"/>
+            <a:endParaRPr lang="en-US"/>
+          </a:p>
+        </p:txBody>
+      </p:sp>
+      <p:pic>
+        <p:nvPicPr>
+          <p:cNvPr id="10" name="Picture 9"/>
+          <p:cNvPicPr>
+            <a:picLocks noChangeAspect="1"/>
+          </p:cNvPicPr>
+          <p:nvPr/>
+        </p:nvPicPr>
+        <p:blipFill>
+          <a:blip r:embed="rId7" cstate="print">
+            <a:extLst>
+              <a:ext uri="{BEBA8EAE-BF5A-486C-A8C5-ECC9F3942E4B}">
+                <a14:imgProps xmlns:a14="http://schemas.microsoft.com/office/drawing/2010/main">
+                  <a14:imgLayer r:embed="rId8">
+                    <a14:imgEffect>
+                      <a14:brightnessContrast bright="11000"/>
+                    </a14:imgEffect>
+                  </a14:imgLayer>
+                </a14:imgProps>
+              </a:ext>
+              <a:ext uri="{28A0092B-C50C-407E-A947-70E740481C1C}">
+                <a14:useLocalDpi xmlns:a14="http://schemas.microsoft.com/office/drawing/2010/main" val="0"/>
+              </a:ext>
+            </a:extLst>
+          </a:blip>
+          <a:stretch>
+            <a:fillRect/>
+          </a:stretch>
+        </p:blipFill>
+        <p:spPr>
+          <a:xfrm>
+            <a:off x="511790" y="2795615"/>
+            <a:ext cx="3898490" cy="2923867"/>
+          </a:xfrm>
+          <a:prstGeom prst="rect">
+            <a:avLst/>
+          </a:prstGeom>
+        </p:spPr>
+      </p:pic>
     </p:spTree>
     <p:extLst>
       <p:ext uri="{BB962C8B-B14F-4D97-AF65-F5344CB8AC3E}">
-        <p14:creationId xmlns:p14="http://schemas.microsoft.com/office/powerpoint/2010/main" val="3747152541"/>
+        <p14:creationId xmlns:p14="http://schemas.microsoft.com/office/powerpoint/2010/main" val="632010277"/>
       </p:ext>
     </p:extLst>
   </p:cSld>
@@ -4327,7 +4377,7 @@
               <a:rPr lang="en-US" sz="3200" dirty="0" smtClean="0">
                 <a:latin typeface="Garamond" panose="02020404030301010803" pitchFamily="18" charset="0"/>
               </a:rPr>
-              <a:t>Challenges &amp; Solutions: Fabrication </a:t>
+              <a:t>Challenges &amp; Solutions: Fabrication Precision </a:t>
             </a:r>
             <a:endParaRPr lang="en-US" sz="3200" dirty="0">
               <a:latin typeface="Garamond" panose="02020404030301010803" pitchFamily="18" charset="0"/>
@@ -4365,125 +4415,25 @@
           </a:fontRef>
         </p:style>
       </p:cxnSp>
-      <p:pic>
-        <p:nvPicPr>
-          <p:cNvPr id="7" name="Picture 6"/>
-          <p:cNvPicPr>
-            <a:picLocks noChangeAspect="1"/>
-          </p:cNvPicPr>
+      <p:sp>
+        <p:nvSpPr>
+          <p:cNvPr id="4" name="Title 1"/>
+          <p:cNvSpPr txBox="1">
+            <a:spLocks/>
+          </p:cNvSpPr>
           <p:nvPr/>
-        </p:nvPicPr>
-        <p:blipFill>
-          <a:blip r:embed="rId3" cstate="print">
-            <a:extLst>
-              <a:ext uri="{28A0092B-C50C-407E-A947-70E740481C1C}">
-                <a14:useLocalDpi xmlns:a14="http://schemas.microsoft.com/office/drawing/2010/main" val="0"/>
-              </a:ext>
-            </a:extLst>
-          </a:blip>
-          <a:stretch>
-            <a:fillRect/>
-          </a:stretch>
-        </p:blipFill>
+        </p:nvSpPr>
         <p:spPr>
           <a:xfrm>
-            <a:off x="775854" y="1600201"/>
-            <a:ext cx="4585855" cy="3439391"/>
+            <a:off x="789709" y="885371"/>
+            <a:ext cx="10515600" cy="5067560"/>
           </a:xfrm>
           <a:prstGeom prst="rect">
             <a:avLst/>
           </a:prstGeom>
         </p:spPr>
-      </p:pic>
-      <p:sp>
-        <p:nvSpPr>
-          <p:cNvPr id="9" name="Right Arrow 8"/>
-          <p:cNvSpPr/>
-          <p:nvPr/>
-        </p:nvSpPr>
-        <p:spPr>
-          <a:xfrm>
-            <a:off x="5616388" y="2883477"/>
-            <a:ext cx="856130" cy="729299"/>
-          </a:xfrm>
-          <a:prstGeom prst="rightArrow">
-            <a:avLst/>
-          </a:prstGeom>
-        </p:spPr>
-        <p:style>
-          <a:lnRef idx="2">
-            <a:schemeClr val="accent1">
-              <a:shade val="50000"/>
-            </a:schemeClr>
-          </a:lnRef>
-          <a:fillRef idx="1">
-            <a:schemeClr val="accent1"/>
-          </a:fillRef>
-          <a:effectRef idx="0">
-            <a:schemeClr val="accent1"/>
-          </a:effectRef>
-          <a:fontRef idx="minor">
-            <a:schemeClr val="lt1"/>
-          </a:fontRef>
-        </p:style>
-        <p:txBody>
-          <a:bodyPr rtlCol="0" anchor="ctr"/>
-          <a:lstStyle/>
-          <a:p>
-            <a:pPr algn="ctr"/>
-            <a:endParaRPr lang="en-US"/>
-          </a:p>
-        </p:txBody>
-      </p:sp>
-      <p:pic>
-        <p:nvPicPr>
-          <p:cNvPr id="10" name="Picture 9"/>
-          <p:cNvPicPr>
-            <a:picLocks noChangeAspect="1"/>
-          </p:cNvPicPr>
-          <p:nvPr/>
-        </p:nvPicPr>
-        <p:blipFill>
-          <a:blip r:embed="rId4" cstate="print">
-            <a:extLst>
-              <a:ext uri="{28A0092B-C50C-407E-A947-70E740481C1C}">
-                <a14:useLocalDpi xmlns:a14="http://schemas.microsoft.com/office/drawing/2010/main" val="0"/>
-              </a:ext>
-            </a:extLst>
-          </a:blip>
-          <a:stretch>
-            <a:fillRect/>
-          </a:stretch>
-        </p:blipFill>
-        <p:spPr>
-          <a:xfrm>
-            <a:off x="6733307" y="1600201"/>
-            <a:ext cx="4585855" cy="3439391"/>
-          </a:xfrm>
-          <a:prstGeom prst="rect">
-            <a:avLst/>
-          </a:prstGeom>
-        </p:spPr>
-      </p:pic>
-      <p:sp>
-        <p:nvSpPr>
-          <p:cNvPr id="17" name="Title 1"/>
-          <p:cNvSpPr txBox="1">
-            <a:spLocks/>
-          </p:cNvSpPr>
-          <p:nvPr/>
-        </p:nvSpPr>
-        <p:spPr>
-          <a:xfrm>
-            <a:off x="686206" y="5550677"/>
-            <a:ext cx="10515600" cy="602673"/>
-          </a:xfrm>
-          <a:prstGeom prst="rect">
-            <a:avLst/>
-          </a:prstGeom>
-        </p:spPr>
-        <p:txBody>
-          <a:bodyPr vert="horz" lIns="91440" tIns="45720" rIns="91440" bIns="45720" rtlCol="0" anchor="b">
+        <p:txBody>
+          <a:bodyPr vert="horz" lIns="91440" tIns="45720" rIns="91440" bIns="45720" rtlCol="0" anchor="t">
             <a:noAutofit/>
           </a:bodyPr>
           <a:lstStyle>
@@ -4506,34 +4456,68 @@
             </a:lvl1pPr>
           </a:lstStyle>
           <a:p>
+            <a:pPr algn="l"/>
             <a:r>
               <a:rPr lang="en-US" sz="3200" dirty="0" smtClean="0">
                 <a:latin typeface="Garamond" panose="02020404030301010803" pitchFamily="18" charset="0"/>
               </a:rPr>
-              <a:t>Fabrication takes a </a:t>
-            </a:r>
-            <a:r>
-              <a:rPr lang="en-US" sz="3200" u="sng" dirty="0" smtClean="0">
+              <a:t>High speeds and </a:t>
+            </a:r>
+            <a:r>
+              <a:rPr lang="en-US" sz="3200" smtClean="0">
                 <a:latin typeface="Garamond" panose="02020404030301010803" pitchFamily="18" charset="0"/>
               </a:rPr>
-              <a:t>lot</a:t>
+              <a:t>loads </a:t>
+            </a:r>
+            <a:r>
+              <a:rPr lang="en-US" sz="3200" smtClean="0">
+                <a:latin typeface="Garamond" panose="02020404030301010803" pitchFamily="18" charset="0"/>
+              </a:rPr>
+              <a:t>with low </a:t>
             </a:r>
             <a:r>
               <a:rPr lang="en-US" sz="3200" dirty="0" smtClean="0">
                 <a:latin typeface="Garamond" panose="02020404030301010803" pitchFamily="18" charset="0"/>
               </a:rPr>
-              <a:t> of time.</a:t>
-            </a:r>
+              <a:t>clearances meant fabrication had to be precise.</a:t>
+            </a:r>
+          </a:p>
+          <a:p>
+            <a:pPr algn="l"/>
             <a:endParaRPr lang="en-US" sz="3200" dirty="0">
               <a:latin typeface="Garamond" panose="02020404030301010803" pitchFamily="18" charset="0"/>
             </a:endParaRPr>
           </a:p>
+          <a:p>
+            <a:pPr algn="l"/>
+            <a:r>
+              <a:rPr lang="en-US" sz="3200" i="1" dirty="0" smtClean="0">
+                <a:latin typeface="Garamond" panose="02020404030301010803" pitchFamily="18" charset="0"/>
+              </a:rPr>
+              <a:t>Insert series of images from </a:t>
+            </a:r>
+            <a:r>
+              <a:rPr lang="en-US" sz="3200" i="1" dirty="0" err="1" smtClean="0">
+                <a:latin typeface="Garamond" panose="02020404030301010803" pitchFamily="18" charset="0"/>
+              </a:rPr>
+              <a:t>Talik</a:t>
+            </a:r>
+            <a:r>
+              <a:rPr lang="en-US" sz="3200" i="1" dirty="0" smtClean="0">
+                <a:latin typeface="Garamond" panose="02020404030301010803" pitchFamily="18" charset="0"/>
+              </a:rPr>
+              <a:t> (impeller, impeller in housing, then add shaft and rest of stuff)</a:t>
+            </a:r>
+            <a:endParaRPr lang="en-US" sz="3200" i="1" dirty="0">
+              <a:latin typeface="Garamond" panose="02020404030301010803" pitchFamily="18" charset="0"/>
+            </a:endParaRPr>
+          </a:p>
         </p:txBody>
       </p:sp>
     </p:spTree>
     <p:extLst>
       <p:ext uri="{BB962C8B-B14F-4D97-AF65-F5344CB8AC3E}">
-        <p14:creationId xmlns:p14="http://schemas.microsoft.com/office/powerpoint/2010/main" val="1843846498"/>
+        <p14:creationId xmlns:p14="http://schemas.microsoft.com/office/powerpoint/2010/main" val="1156267332"/>
       </p:ext>
     </p:extLst>
   </p:cSld>
@@ -4569,67 +4553,120 @@
       </p:grpSpPr>
       <p:sp>
         <p:nvSpPr>
-          <p:cNvPr id="8" name="Title 1"/>
-          <p:cNvSpPr txBox="1">
-            <a:spLocks/>
-          </p:cNvSpPr>
-          <p:nvPr/>
+          <p:cNvPr id="4" name="Slide Number Placeholder 3"/>
+          <p:cNvSpPr>
+            <a:spLocks noGrp="1"/>
+          </p:cNvSpPr>
+          <p:nvPr>
+            <p:ph type="sldNum" sz="quarter" idx="12"/>
+          </p:nvPr>
         </p:nvSpPr>
         <p:spPr>
           <a:xfrm>
-            <a:off x="775854" y="0"/>
-            <a:ext cx="10515600" cy="602673"/>
+            <a:off x="9306059" y="6438513"/>
+            <a:ext cx="2743200" cy="365125"/>
+          </a:xfrm>
+        </p:spPr>
+        <p:txBody>
+          <a:bodyPr/>
+          <a:lstStyle/>
+          <a:p>
+            <a:fld id="{27225834-A5F4-4780-A9FC-586FB30F9BB0}" type="slidenum">
+              <a:rPr lang="en-US" smtClean="0">
+                <a:latin typeface="Garamond" panose="02020404030301010803" pitchFamily="18" charset="0"/>
+              </a:rPr>
+              <a:t>4</a:t>
+            </a:fld>
+            <a:endParaRPr lang="en-US" dirty="0">
+              <a:latin typeface="Garamond" panose="02020404030301010803" pitchFamily="18" charset="0"/>
+            </a:endParaRPr>
+          </a:p>
+        </p:txBody>
+      </p:sp>
+      <p:sp>
+        <p:nvSpPr>
+          <p:cNvPr id="19" name="TextBox 18"/>
+          <p:cNvSpPr txBox="1"/>
+          <p:nvPr/>
+        </p:nvSpPr>
+        <p:spPr>
+          <a:xfrm>
+            <a:off x="128788" y="6482577"/>
+            <a:ext cx="4201920" cy="276999"/>
           </a:xfrm>
           <a:prstGeom prst="rect">
             <a:avLst/>
           </a:prstGeom>
+          <a:noFill/>
         </p:spPr>
         <p:txBody>
-          <a:bodyPr vert="horz" lIns="91440" tIns="45720" rIns="91440" bIns="45720" rtlCol="0" anchor="b">
-            <a:noAutofit/>
+          <a:bodyPr wrap="none" rtlCol="0">
+            <a:spAutoFit/>
           </a:bodyPr>
-          <a:lstStyle>
-            <a:lvl1pPr algn="ctr" defTabSz="914400" rtl="0" eaLnBrk="1" latinLnBrk="0" hangingPunct="1">
-              <a:lnSpc>
-                <a:spcPct val="90000"/>
-              </a:lnSpc>
-              <a:spcBef>
-                <a:spcPct val="0"/>
-              </a:spcBef>
-              <a:buNone/>
-              <a:defRPr sz="6000" kern="1200">
-                <a:solidFill>
-                  <a:schemeClr val="tx1"/>
-                </a:solidFill>
-                <a:latin typeface="+mj-lt"/>
-                <a:ea typeface="+mj-ea"/>
-                <a:cs typeface="+mj-cs"/>
-              </a:defRPr>
-            </a:lvl1pPr>
-          </a:lstStyle>
-          <a:p>
-            <a:r>
-              <a:rPr lang="en-US" sz="3200" dirty="0" smtClean="0">
+          <a:lstStyle/>
+          <a:p>
+            <a:r>
+              <a:rPr lang="en-US" sz="1200" dirty="0" smtClean="0">
                 <a:latin typeface="Garamond" panose="02020404030301010803" pitchFamily="18" charset="0"/>
+                <a:cs typeface="Times New Roman" panose="02020603050405020304" pitchFamily="18" charset="0"/>
               </a:rPr>
-              <a:t>Challenges &amp; Solutions: Fabrication </a:t>
-            </a:r>
-            <a:endParaRPr lang="en-US" sz="3200" dirty="0">
+              <a:t>Portland State Aerospace Society | Electric Propellant Feed System</a:t>
+            </a:r>
+            <a:endParaRPr lang="en-US" sz="1200" dirty="0">
               <a:latin typeface="Garamond" panose="02020404030301010803" pitchFamily="18" charset="0"/>
+              <a:cs typeface="Times New Roman" panose="02020603050405020304" pitchFamily="18" charset="0"/>
+            </a:endParaRPr>
+          </a:p>
+        </p:txBody>
+      </p:sp>
+      <p:sp>
+        <p:nvSpPr>
+          <p:cNvPr id="5" name="TextBox 4"/>
+          <p:cNvSpPr txBox="1"/>
+          <p:nvPr/>
+        </p:nvSpPr>
+        <p:spPr>
+          <a:xfrm>
+            <a:off x="128788" y="0"/>
+            <a:ext cx="828175" cy="276999"/>
+          </a:xfrm>
+          <a:prstGeom prst="rect">
+            <a:avLst/>
+          </a:prstGeom>
+          <a:noFill/>
+        </p:spPr>
+        <p:txBody>
+          <a:bodyPr wrap="none" rtlCol="0">
+            <a:spAutoFit/>
+          </a:bodyPr>
+          <a:lstStyle/>
+          <a:p>
+            <a:r>
+              <a:rPr lang="en-US" sz="1200" dirty="0" smtClean="0">
+                <a:latin typeface="Garamond" panose="02020404030301010803" pitchFamily="18" charset="0"/>
+                <a:cs typeface="Times New Roman" panose="02020603050405020304" pitchFamily="18" charset="0"/>
+              </a:rPr>
+              <a:t>Challenges</a:t>
+            </a:r>
+            <a:endParaRPr lang="en-US" sz="1200" dirty="0">
+              <a:latin typeface="Garamond" panose="02020404030301010803" pitchFamily="18" charset="0"/>
+              <a:cs typeface="Times New Roman" panose="02020603050405020304" pitchFamily="18" charset="0"/>
             </a:endParaRPr>
           </a:p>
         </p:txBody>
       </p:sp>
       <p:cxnSp>
         <p:nvCxnSpPr>
-          <p:cNvPr id="3" name="Straight Connector 2"/>
-          <p:cNvCxnSpPr/>
+          <p:cNvPr id="10" name="Straight Connector 9"/>
+          <p:cNvCxnSpPr>
+            <a:endCxn id="5" idx="2"/>
+          </p:cNvCxnSpPr>
           <p:nvPr/>
         </p:nvCxnSpPr>
         <p:spPr>
           <a:xfrm>
-            <a:off x="519545" y="644238"/>
-            <a:ext cx="11055928" cy="0"/>
+            <a:off x="235677" y="276999"/>
+            <a:ext cx="307199" cy="0"/>
           </a:xfrm>
           <a:prstGeom prst="line">
             <a:avLst/>
@@ -4650,10 +4687,256 @@
           </a:fontRef>
         </p:style>
       </p:cxnSp>
+      <p:sp>
+        <p:nvSpPr>
+          <p:cNvPr id="15" name="TextBox 14"/>
+          <p:cNvSpPr txBox="1"/>
+          <p:nvPr/>
+        </p:nvSpPr>
+        <p:spPr>
+          <a:xfrm>
+            <a:off x="0" y="553998"/>
+            <a:ext cx="7339263" cy="3477875"/>
+          </a:xfrm>
+          <a:prstGeom prst="rect">
+            <a:avLst/>
+          </a:prstGeom>
+          <a:noFill/>
+        </p:spPr>
+        <p:txBody>
+          <a:bodyPr wrap="square" rtlCol="0">
+            <a:spAutoFit/>
+          </a:bodyPr>
+          <a:lstStyle/>
+          <a:p>
+            <a:r>
+              <a:rPr lang="en-US" dirty="0" smtClean="0">
+                <a:latin typeface="Garamond" panose="02020404030301010803" pitchFamily="18" charset="0"/>
+              </a:rPr>
+              <a:t>Notes:</a:t>
+            </a:r>
+          </a:p>
+          <a:p>
+            <a:pPr marL="342900" indent="-342900">
+              <a:buAutoNum type="arabicPeriod"/>
+            </a:pPr>
+            <a:r>
+              <a:rPr lang="en-US" sz="2000" b="1" dirty="0" smtClean="0">
+                <a:latin typeface="Garamond" panose="02020404030301010803" pitchFamily="18" charset="0"/>
+              </a:rPr>
+              <a:t>Casing Design and Manufacturing</a:t>
+            </a:r>
+          </a:p>
+          <a:p>
+            <a:pPr marL="342900" indent="-342900">
+              <a:buAutoNum type="arabicPeriod"/>
+            </a:pPr>
+            <a:endParaRPr lang="en-US" sz="2000" b="1" dirty="0" smtClean="0">
+              <a:latin typeface="Garamond" panose="02020404030301010803" pitchFamily="18" charset="0"/>
+            </a:endParaRPr>
+          </a:p>
+          <a:p>
+            <a:r>
+              <a:rPr lang="en-US" b="1" dirty="0" smtClean="0">
+                <a:latin typeface="Garamond" panose="02020404030301010803" pitchFamily="18" charset="0"/>
+              </a:rPr>
+              <a:t>Problems:</a:t>
+            </a:r>
+          </a:p>
+          <a:p>
+            <a:pPr marL="285750" indent="-285750">
+              <a:buFont typeface="Arial" panose="020B0604020202020204" pitchFamily="34" charset="0"/>
+              <a:buChar char="•"/>
+            </a:pPr>
+            <a:r>
+              <a:rPr lang="en-US" dirty="0" smtClean="0">
+                <a:latin typeface="Garamond" panose="02020404030301010803" pitchFamily="18" charset="0"/>
+              </a:rPr>
+              <a:t>High RPMs / High Pressure</a:t>
+            </a:r>
+          </a:p>
+          <a:p>
+            <a:pPr marL="285750" indent="-285750">
+              <a:buFont typeface="Arial" panose="020B0604020202020204" pitchFamily="34" charset="0"/>
+              <a:buChar char="•"/>
+            </a:pPr>
+            <a:r>
+              <a:rPr lang="en-US" dirty="0" smtClean="0">
+                <a:latin typeface="Garamond" panose="02020404030301010803" pitchFamily="18" charset="0"/>
+              </a:rPr>
+              <a:t>Alignment / Clearances / Fits</a:t>
+            </a:r>
+          </a:p>
+          <a:p>
+            <a:pPr marL="285750" indent="-285750">
+              <a:buFont typeface="Arial" panose="020B0604020202020204" pitchFamily="34" charset="0"/>
+              <a:buChar char="•"/>
+            </a:pPr>
+            <a:r>
+              <a:rPr lang="en-US" dirty="0" smtClean="0">
+                <a:latin typeface="Garamond" panose="02020404030301010803" pitchFamily="18" charset="0"/>
+              </a:rPr>
+              <a:t>Ensuring Safe operation and preventing leakage</a:t>
+            </a:r>
+          </a:p>
+          <a:p>
+            <a:endParaRPr lang="en-US" dirty="0">
+              <a:latin typeface="Garamond" panose="02020404030301010803" pitchFamily="18" charset="0"/>
+            </a:endParaRPr>
+          </a:p>
+          <a:p>
+            <a:r>
+              <a:rPr lang="en-US" b="1" dirty="0" smtClean="0">
+                <a:latin typeface="Garamond" panose="02020404030301010803" pitchFamily="18" charset="0"/>
+              </a:rPr>
+              <a:t>Solutions: </a:t>
+            </a:r>
+          </a:p>
+          <a:p>
+            <a:pPr marL="285750" indent="-285750">
+              <a:buFont typeface="Arial" panose="020B0604020202020204" pitchFamily="34" charset="0"/>
+              <a:buChar char="•"/>
+            </a:pPr>
+            <a:r>
+              <a:rPr lang="en-US" dirty="0" smtClean="0">
+                <a:latin typeface="Garamond" panose="02020404030301010803" pitchFamily="18" charset="0"/>
+              </a:rPr>
+              <a:t> Bearing arrangement and selection</a:t>
+            </a:r>
+          </a:p>
+          <a:p>
+            <a:pPr marL="285750" indent="-285750">
+              <a:buFont typeface="Arial" panose="020B0604020202020204" pitchFamily="34" charset="0"/>
+              <a:buChar char="•"/>
+            </a:pPr>
+            <a:r>
+              <a:rPr lang="en-US" dirty="0" smtClean="0">
+                <a:latin typeface="Garamond" panose="02020404030301010803" pitchFamily="18" charset="0"/>
+              </a:rPr>
+              <a:t>Seal / bushing</a:t>
+            </a:r>
+          </a:p>
+          <a:p>
+            <a:pPr marL="285750" indent="-285750">
+              <a:buFont typeface="Arial" panose="020B0604020202020204" pitchFamily="34" charset="0"/>
+              <a:buChar char="•"/>
+            </a:pPr>
+            <a:r>
+              <a:rPr lang="en-US" dirty="0" smtClean="0">
+                <a:latin typeface="Garamond" panose="02020404030301010803" pitchFamily="18" charset="0"/>
+              </a:rPr>
+              <a:t>Precision execution with 3 axis CNC  </a:t>
+            </a:r>
+          </a:p>
+        </p:txBody>
+      </p:sp>
+      <p:sp>
+        <p:nvSpPr>
+          <p:cNvPr id="11" name="TextBox 10"/>
+          <p:cNvSpPr txBox="1"/>
+          <p:nvPr/>
+        </p:nvSpPr>
+        <p:spPr>
+          <a:xfrm>
+            <a:off x="7603250" y="138499"/>
+            <a:ext cx="6490448" cy="1477328"/>
+          </a:xfrm>
+          <a:prstGeom prst="rect">
+            <a:avLst/>
+          </a:prstGeom>
+          <a:noFill/>
+        </p:spPr>
+        <p:txBody>
+          <a:bodyPr wrap="square" rtlCol="0">
+            <a:spAutoFit/>
+          </a:bodyPr>
+          <a:lstStyle/>
+          <a:p>
+            <a:r>
+              <a:rPr lang="en-US" dirty="0" smtClean="0">
+                <a:latin typeface="Garamond" panose="02020404030301010803" pitchFamily="18" charset="0"/>
+              </a:rPr>
+              <a:t>To insert: </a:t>
+            </a:r>
+          </a:p>
+          <a:p>
+            <a:pPr marL="285750" indent="-285750">
+              <a:buFontTx/>
+              <a:buChar char="-"/>
+            </a:pPr>
+            <a:r>
+              <a:rPr lang="en-US" dirty="0" smtClean="0">
+                <a:latin typeface="Garamond" panose="02020404030301010803" pitchFamily="18" charset="0"/>
+              </a:rPr>
+              <a:t>Quarter section – Cad Model </a:t>
+            </a:r>
+          </a:p>
+          <a:p>
+            <a:pPr marL="285750" indent="-285750">
+              <a:buFontTx/>
+              <a:buChar char="-"/>
+            </a:pPr>
+            <a:r>
+              <a:rPr lang="en-US" dirty="0" smtClean="0">
+                <a:latin typeface="Garamond" panose="02020404030301010803" pitchFamily="18" charset="0"/>
+              </a:rPr>
+              <a:t>Bearing Schematic ? – Diagram</a:t>
+            </a:r>
+          </a:p>
+          <a:p>
+            <a:pPr marL="285750" indent="-285750">
+              <a:buFontTx/>
+              <a:buChar char="-"/>
+            </a:pPr>
+            <a:r>
+              <a:rPr lang="en-US" dirty="0" smtClean="0">
+                <a:latin typeface="Garamond" panose="02020404030301010803" pitchFamily="18" charset="0"/>
+              </a:rPr>
+              <a:t>CNC operation – High res of john/</a:t>
+            </a:r>
+            <a:r>
+              <a:rPr lang="en-US" dirty="0" err="1" smtClean="0">
+                <a:latin typeface="Garamond" panose="02020404030301010803" pitchFamily="18" charset="0"/>
+              </a:rPr>
+              <a:t>james</a:t>
+            </a:r>
+            <a:r>
+              <a:rPr lang="en-US" dirty="0" smtClean="0">
+                <a:latin typeface="Garamond" panose="02020404030301010803" pitchFamily="18" charset="0"/>
+              </a:rPr>
+              <a:t>/</a:t>
+            </a:r>
+            <a:r>
+              <a:rPr lang="en-US" dirty="0" err="1" smtClean="0">
+                <a:latin typeface="Garamond" panose="02020404030301010803" pitchFamily="18" charset="0"/>
+              </a:rPr>
+              <a:t>kris</a:t>
+            </a:r>
+            <a:r>
+              <a:rPr lang="en-US" dirty="0" smtClean="0">
+                <a:latin typeface="Garamond" panose="02020404030301010803" pitchFamily="18" charset="0"/>
+              </a:rPr>
+              <a:t> </a:t>
+            </a:r>
+          </a:p>
+          <a:p>
+            <a:pPr marL="285750" indent="-285750">
+              <a:buFontTx/>
+              <a:buChar char="-"/>
+            </a:pPr>
+            <a:r>
+              <a:rPr lang="en-US" dirty="0" smtClean="0">
+                <a:latin typeface="Garamond" panose="02020404030301010803" pitchFamily="18" charset="0"/>
+              </a:rPr>
+              <a:t>Hours in machine shop - Figure</a:t>
+            </a:r>
+          </a:p>
+        </p:txBody>
+      </p:sp>
     </p:spTree>
     <p:extLst>
       <p:ext uri="{BB962C8B-B14F-4D97-AF65-F5344CB8AC3E}">
-        <p14:creationId xmlns:p14="http://schemas.microsoft.com/office/powerpoint/2010/main" val="632010277"/>
+        <p14:creationId xmlns:p14="http://schemas.microsoft.com/office/powerpoint/2010/main" val="4121114597"/>
       </p:ext>
     </p:extLst>
   </p:cSld>
@@ -4712,425 +4995,6 @@
                 <a:latin typeface="Garamond" panose="02020404030301010803" pitchFamily="18" charset="0"/>
               </a:rPr>
               <a:t>5</a:t>
-            </a:fld>
-            <a:endParaRPr lang="en-US" dirty="0">
-              <a:latin typeface="Garamond" panose="02020404030301010803" pitchFamily="18" charset="0"/>
-            </a:endParaRPr>
-          </a:p>
-        </p:txBody>
-      </p:sp>
-      <p:sp>
-        <p:nvSpPr>
-          <p:cNvPr id="19" name="TextBox 18"/>
-          <p:cNvSpPr txBox="1"/>
-          <p:nvPr/>
-        </p:nvSpPr>
-        <p:spPr>
-          <a:xfrm>
-            <a:off x="128788" y="6482577"/>
-            <a:ext cx="4201920" cy="276999"/>
-          </a:xfrm>
-          <a:prstGeom prst="rect">
-            <a:avLst/>
-          </a:prstGeom>
-          <a:noFill/>
-        </p:spPr>
-        <p:txBody>
-          <a:bodyPr wrap="none" rtlCol="0">
-            <a:spAutoFit/>
-          </a:bodyPr>
-          <a:lstStyle/>
-          <a:p>
-            <a:r>
-              <a:rPr lang="en-US" sz="1200" dirty="0" smtClean="0">
-                <a:latin typeface="Garamond" panose="02020404030301010803" pitchFamily="18" charset="0"/>
-                <a:cs typeface="Times New Roman" panose="02020603050405020304" pitchFamily="18" charset="0"/>
-              </a:rPr>
-              <a:t>Portland State Aerospace Society | Electric Propellant Feed System</a:t>
-            </a:r>
-            <a:endParaRPr lang="en-US" sz="1200" dirty="0">
-              <a:latin typeface="Garamond" panose="02020404030301010803" pitchFamily="18" charset="0"/>
-              <a:cs typeface="Times New Roman" panose="02020603050405020304" pitchFamily="18" charset="0"/>
-            </a:endParaRPr>
-          </a:p>
-        </p:txBody>
-      </p:sp>
-      <p:sp>
-        <p:nvSpPr>
-          <p:cNvPr id="5" name="TextBox 4"/>
-          <p:cNvSpPr txBox="1"/>
-          <p:nvPr/>
-        </p:nvSpPr>
-        <p:spPr>
-          <a:xfrm>
-            <a:off x="128788" y="0"/>
-            <a:ext cx="828175" cy="276999"/>
-          </a:xfrm>
-          <a:prstGeom prst="rect">
-            <a:avLst/>
-          </a:prstGeom>
-          <a:noFill/>
-        </p:spPr>
-        <p:txBody>
-          <a:bodyPr wrap="none" rtlCol="0">
-            <a:spAutoFit/>
-          </a:bodyPr>
-          <a:lstStyle/>
-          <a:p>
-            <a:r>
-              <a:rPr lang="en-US" sz="1200" dirty="0" smtClean="0">
-                <a:latin typeface="Garamond" panose="02020404030301010803" pitchFamily="18" charset="0"/>
-                <a:cs typeface="Times New Roman" panose="02020603050405020304" pitchFamily="18" charset="0"/>
-              </a:rPr>
-              <a:t>Challenges</a:t>
-            </a:r>
-            <a:endParaRPr lang="en-US" sz="1200" dirty="0">
-              <a:latin typeface="Garamond" panose="02020404030301010803" pitchFamily="18" charset="0"/>
-              <a:cs typeface="Times New Roman" panose="02020603050405020304" pitchFamily="18" charset="0"/>
-            </a:endParaRPr>
-          </a:p>
-        </p:txBody>
-      </p:sp>
-      <p:cxnSp>
-        <p:nvCxnSpPr>
-          <p:cNvPr id="10" name="Straight Connector 9"/>
-          <p:cNvCxnSpPr>
-            <a:endCxn id="5" idx="2"/>
-          </p:cNvCxnSpPr>
-          <p:nvPr/>
-        </p:nvCxnSpPr>
-        <p:spPr>
-          <a:xfrm>
-            <a:off x="235677" y="276999"/>
-            <a:ext cx="307199" cy="0"/>
-          </a:xfrm>
-          <a:prstGeom prst="line">
-            <a:avLst/>
-          </a:prstGeom>
-        </p:spPr>
-        <p:style>
-          <a:lnRef idx="1">
-            <a:schemeClr val="dk1"/>
-          </a:lnRef>
-          <a:fillRef idx="0">
-            <a:schemeClr val="dk1"/>
-          </a:fillRef>
-          <a:effectRef idx="0">
-            <a:schemeClr val="dk1"/>
-          </a:effectRef>
-          <a:fontRef idx="minor">
-            <a:schemeClr val="tx1"/>
-          </a:fontRef>
-        </p:style>
-      </p:cxnSp>
-      <p:sp>
-        <p:nvSpPr>
-          <p:cNvPr id="15" name="TextBox 14"/>
-          <p:cNvSpPr txBox="1"/>
-          <p:nvPr/>
-        </p:nvSpPr>
-        <p:spPr>
-          <a:xfrm>
-            <a:off x="0" y="553998"/>
-            <a:ext cx="7339263" cy="3477875"/>
-          </a:xfrm>
-          <a:prstGeom prst="rect">
-            <a:avLst/>
-          </a:prstGeom>
-          <a:noFill/>
-        </p:spPr>
-        <p:txBody>
-          <a:bodyPr wrap="square" rtlCol="0">
-            <a:spAutoFit/>
-          </a:bodyPr>
-          <a:lstStyle/>
-          <a:p>
-            <a:r>
-              <a:rPr lang="en-US" dirty="0" smtClean="0">
-                <a:latin typeface="Garamond" panose="02020404030301010803" pitchFamily="18" charset="0"/>
-              </a:rPr>
-              <a:t>Notes:</a:t>
-            </a:r>
-          </a:p>
-          <a:p>
-            <a:pPr marL="342900" indent="-342900">
-              <a:buAutoNum type="arabicPeriod"/>
-            </a:pPr>
-            <a:r>
-              <a:rPr lang="en-US" sz="2000" b="1" dirty="0" smtClean="0">
-                <a:latin typeface="Garamond" panose="02020404030301010803" pitchFamily="18" charset="0"/>
-              </a:rPr>
-              <a:t>Casing Design and Manufacturing</a:t>
-            </a:r>
-          </a:p>
-          <a:p>
-            <a:pPr marL="342900" indent="-342900">
-              <a:buAutoNum type="arabicPeriod"/>
-            </a:pPr>
-            <a:endParaRPr lang="en-US" sz="2000" b="1" dirty="0" smtClean="0">
-              <a:latin typeface="Garamond" panose="02020404030301010803" pitchFamily="18" charset="0"/>
-            </a:endParaRPr>
-          </a:p>
-          <a:p>
-            <a:r>
-              <a:rPr lang="en-US" b="1" dirty="0" smtClean="0">
-                <a:latin typeface="Garamond" panose="02020404030301010803" pitchFamily="18" charset="0"/>
-              </a:rPr>
-              <a:t>Problems:</a:t>
-            </a:r>
-          </a:p>
-          <a:p>
-            <a:pPr marL="285750" indent="-285750">
-              <a:buFont typeface="Arial" panose="020B0604020202020204" pitchFamily="34" charset="0"/>
-              <a:buChar char="•"/>
-            </a:pPr>
-            <a:r>
-              <a:rPr lang="en-US" dirty="0" smtClean="0">
-                <a:latin typeface="Garamond" panose="02020404030301010803" pitchFamily="18" charset="0"/>
-              </a:rPr>
-              <a:t>High RPMs / High Pressure</a:t>
-            </a:r>
-          </a:p>
-          <a:p>
-            <a:pPr marL="285750" indent="-285750">
-              <a:buFont typeface="Arial" panose="020B0604020202020204" pitchFamily="34" charset="0"/>
-              <a:buChar char="•"/>
-            </a:pPr>
-            <a:r>
-              <a:rPr lang="en-US" dirty="0" smtClean="0">
-                <a:latin typeface="Garamond" panose="02020404030301010803" pitchFamily="18" charset="0"/>
-              </a:rPr>
-              <a:t>Alignment / Clearances / Fits</a:t>
-            </a:r>
-          </a:p>
-          <a:p>
-            <a:pPr marL="285750" indent="-285750">
-              <a:buFont typeface="Arial" panose="020B0604020202020204" pitchFamily="34" charset="0"/>
-              <a:buChar char="•"/>
-            </a:pPr>
-            <a:r>
-              <a:rPr lang="en-US" dirty="0" smtClean="0">
-                <a:latin typeface="Garamond" panose="02020404030301010803" pitchFamily="18" charset="0"/>
-              </a:rPr>
-              <a:t>Ensuring Safe operation and preventing leakage</a:t>
-            </a:r>
-          </a:p>
-          <a:p>
-            <a:endParaRPr lang="en-US" dirty="0">
-              <a:latin typeface="Garamond" panose="02020404030301010803" pitchFamily="18" charset="0"/>
-            </a:endParaRPr>
-          </a:p>
-          <a:p>
-            <a:r>
-              <a:rPr lang="en-US" b="1" dirty="0" smtClean="0">
-                <a:latin typeface="Garamond" panose="02020404030301010803" pitchFamily="18" charset="0"/>
-              </a:rPr>
-              <a:t>Solutions: </a:t>
-            </a:r>
-          </a:p>
-          <a:p>
-            <a:pPr marL="285750" indent="-285750">
-              <a:buFont typeface="Arial" panose="020B0604020202020204" pitchFamily="34" charset="0"/>
-              <a:buChar char="•"/>
-            </a:pPr>
-            <a:r>
-              <a:rPr lang="en-US" dirty="0" smtClean="0">
-                <a:latin typeface="Garamond" panose="02020404030301010803" pitchFamily="18" charset="0"/>
-              </a:rPr>
-              <a:t> Bearing arrangement and selection</a:t>
-            </a:r>
-          </a:p>
-          <a:p>
-            <a:pPr marL="285750" indent="-285750">
-              <a:buFont typeface="Arial" panose="020B0604020202020204" pitchFamily="34" charset="0"/>
-              <a:buChar char="•"/>
-            </a:pPr>
-            <a:r>
-              <a:rPr lang="en-US" dirty="0" smtClean="0">
-                <a:latin typeface="Garamond" panose="02020404030301010803" pitchFamily="18" charset="0"/>
-              </a:rPr>
-              <a:t>Seal / bushing</a:t>
-            </a:r>
-          </a:p>
-          <a:p>
-            <a:pPr marL="285750" indent="-285750">
-              <a:buFont typeface="Arial" panose="020B0604020202020204" pitchFamily="34" charset="0"/>
-              <a:buChar char="•"/>
-            </a:pPr>
-            <a:r>
-              <a:rPr lang="en-US" dirty="0" smtClean="0">
-                <a:latin typeface="Garamond" panose="02020404030301010803" pitchFamily="18" charset="0"/>
-              </a:rPr>
-              <a:t>Precision execution with 3 axis CNC  </a:t>
-            </a:r>
-          </a:p>
-        </p:txBody>
-      </p:sp>
-      <p:sp>
-        <p:nvSpPr>
-          <p:cNvPr id="11" name="TextBox 10"/>
-          <p:cNvSpPr txBox="1"/>
-          <p:nvPr/>
-        </p:nvSpPr>
-        <p:spPr>
-          <a:xfrm>
-            <a:off x="7603250" y="138499"/>
-            <a:ext cx="6490448" cy="1477328"/>
-          </a:xfrm>
-          <a:prstGeom prst="rect">
-            <a:avLst/>
-          </a:prstGeom>
-          <a:noFill/>
-        </p:spPr>
-        <p:txBody>
-          <a:bodyPr wrap="square" rtlCol="0">
-            <a:spAutoFit/>
-          </a:bodyPr>
-          <a:lstStyle/>
-          <a:p>
-            <a:r>
-              <a:rPr lang="en-US" dirty="0" smtClean="0">
-                <a:latin typeface="Garamond" panose="02020404030301010803" pitchFamily="18" charset="0"/>
-              </a:rPr>
-              <a:t>To insert: </a:t>
-            </a:r>
-          </a:p>
-          <a:p>
-            <a:pPr marL="285750" indent="-285750">
-              <a:buFontTx/>
-              <a:buChar char="-"/>
-            </a:pPr>
-            <a:r>
-              <a:rPr lang="en-US" dirty="0" smtClean="0">
-                <a:latin typeface="Garamond" panose="02020404030301010803" pitchFamily="18" charset="0"/>
-              </a:rPr>
-              <a:t>Quarter section – Cad Model </a:t>
-            </a:r>
-          </a:p>
-          <a:p>
-            <a:pPr marL="285750" indent="-285750">
-              <a:buFontTx/>
-              <a:buChar char="-"/>
-            </a:pPr>
-            <a:r>
-              <a:rPr lang="en-US" dirty="0" smtClean="0">
-                <a:latin typeface="Garamond" panose="02020404030301010803" pitchFamily="18" charset="0"/>
-              </a:rPr>
-              <a:t>Bearing Schematic ? – Diagram</a:t>
-            </a:r>
-          </a:p>
-          <a:p>
-            <a:pPr marL="285750" indent="-285750">
-              <a:buFontTx/>
-              <a:buChar char="-"/>
-            </a:pPr>
-            <a:r>
-              <a:rPr lang="en-US" dirty="0" smtClean="0">
-                <a:latin typeface="Garamond" panose="02020404030301010803" pitchFamily="18" charset="0"/>
-              </a:rPr>
-              <a:t>CNC operation – High res of john/</a:t>
-            </a:r>
-            <a:r>
-              <a:rPr lang="en-US" dirty="0" err="1" smtClean="0">
-                <a:latin typeface="Garamond" panose="02020404030301010803" pitchFamily="18" charset="0"/>
-              </a:rPr>
-              <a:t>james</a:t>
-            </a:r>
-            <a:r>
-              <a:rPr lang="en-US" dirty="0" smtClean="0">
-                <a:latin typeface="Garamond" panose="02020404030301010803" pitchFamily="18" charset="0"/>
-              </a:rPr>
-              <a:t>/</a:t>
-            </a:r>
-            <a:r>
-              <a:rPr lang="en-US" dirty="0" err="1" smtClean="0">
-                <a:latin typeface="Garamond" panose="02020404030301010803" pitchFamily="18" charset="0"/>
-              </a:rPr>
-              <a:t>kris</a:t>
-            </a:r>
-            <a:r>
-              <a:rPr lang="en-US" dirty="0" smtClean="0">
-                <a:latin typeface="Garamond" panose="02020404030301010803" pitchFamily="18" charset="0"/>
-              </a:rPr>
-              <a:t> </a:t>
-            </a:r>
-          </a:p>
-          <a:p>
-            <a:pPr marL="285750" indent="-285750">
-              <a:buFontTx/>
-              <a:buChar char="-"/>
-            </a:pPr>
-            <a:r>
-              <a:rPr lang="en-US" dirty="0" smtClean="0">
-                <a:latin typeface="Garamond" panose="02020404030301010803" pitchFamily="18" charset="0"/>
-              </a:rPr>
-              <a:t>Hours in machine shop - Figure</a:t>
-            </a:r>
-          </a:p>
-        </p:txBody>
-      </p:sp>
-    </p:spTree>
-    <p:extLst>
-      <p:ext uri="{BB962C8B-B14F-4D97-AF65-F5344CB8AC3E}">
-        <p14:creationId xmlns:p14="http://schemas.microsoft.com/office/powerpoint/2010/main" val="4121114597"/>
-      </p:ext>
-    </p:extLst>
-  </p:cSld>
-  <p:clrMapOvr>
-    <a:masterClrMapping/>
-  </p:clrMapOvr>
-  <p:timing>
-    <p:tnLst>
-      <p:par>
-        <p:cTn id="1" dur="indefinite" restart="never" nodeType="tmRoot"/>
-      </p:par>
-    </p:tnLst>
-  </p:timing>
-</p:sld>
-</file>
-
-<file path=ppt/slides/slide6.xml><?xml version="1.0" encoding="utf-8"?>
-<p:sld xmlns:a="http://schemas.openxmlformats.org/drawingml/2006/main" xmlns:r="http://schemas.openxmlformats.org/officeDocument/2006/relationships" xmlns:p="http://schemas.openxmlformats.org/presentationml/2006/main">
-  <p:cSld>
-    <p:spTree>
-      <p:nvGrpSpPr>
-        <p:cNvPr id="1" name=""/>
-        <p:cNvGrpSpPr/>
-        <p:nvPr/>
-      </p:nvGrpSpPr>
-      <p:grpSpPr>
-        <a:xfrm>
-          <a:off x="0" y="0"/>
-          <a:ext cx="0" cy="0"/>
-          <a:chOff x="0" y="0"/>
-          <a:chExt cx="0" cy="0"/>
-        </a:xfrm>
-      </p:grpSpPr>
-      <p:sp>
-        <p:nvSpPr>
-          <p:cNvPr id="4" name="Slide Number Placeholder 3"/>
-          <p:cNvSpPr>
-            <a:spLocks noGrp="1"/>
-          </p:cNvSpPr>
-          <p:nvPr>
-            <p:ph type="sldNum" sz="quarter" idx="12"/>
-          </p:nvPr>
-        </p:nvSpPr>
-        <p:spPr>
-          <a:xfrm>
-            <a:off x="9306059" y="6438513"/>
-            <a:ext cx="2743200" cy="365125"/>
-          </a:xfrm>
-        </p:spPr>
-        <p:txBody>
-          <a:bodyPr/>
-          <a:lstStyle/>
-          <a:p>
-            <a:fld id="{27225834-A5F4-4780-A9FC-586FB30F9BB0}" type="slidenum">
-              <a:rPr lang="en-US" smtClean="0">
-                <a:latin typeface="Garamond" panose="02020404030301010803" pitchFamily="18" charset="0"/>
-              </a:rPr>
-              <a:t>6</a:t>
             </a:fld>
             <a:endParaRPr lang="en-US" dirty="0">
               <a:latin typeface="Garamond" panose="02020404030301010803" pitchFamily="18" charset="0"/>

</xml_diff>